<commit_message>
Petites corrections, par exemple millet , mais aussi vermillon et mille en général.
</commit_message>
<xml_diff>
--- a/Doc/Manuels/Panneau config.pptx
+++ b/Doc/Manuels/Panneau config.pptx
@@ -7,6 +7,7 @@
   <p:sldIdLst>
     <p:sldId id="257" r:id="rId2"/>
     <p:sldId id="258" r:id="rId3"/>
+    <p:sldId id="259" r:id="rId4"/>
   </p:sldIdLst>
   <p:sldSz cx="6858000" cy="9906000" type="A4"/>
   <p:notesSz cx="6858000" cy="9144000"/>
@@ -244,7 +245,7 @@
           <a:p>
             <a:fld id="{A019C843-81E1-4383-9F8F-73842B62BEA2}" type="datetimeFigureOut">
               <a:rPr lang="fr-CH" smtClean="0"/>
-              <a:t>30.04.2020</a:t>
+              <a:t>13.05.2020</a:t>
             </a:fld>
             <a:endParaRPr lang="fr-CH"/>
           </a:p>
@@ -414,7 +415,7 @@
           <a:p>
             <a:fld id="{A019C843-81E1-4383-9F8F-73842B62BEA2}" type="datetimeFigureOut">
               <a:rPr lang="fr-CH" smtClean="0"/>
-              <a:t>30.04.2020</a:t>
+              <a:t>13.05.2020</a:t>
             </a:fld>
             <a:endParaRPr lang="fr-CH"/>
           </a:p>
@@ -594,7 +595,7 @@
           <a:p>
             <a:fld id="{A019C843-81E1-4383-9F8F-73842B62BEA2}" type="datetimeFigureOut">
               <a:rPr lang="fr-CH" smtClean="0"/>
-              <a:t>30.04.2020</a:t>
+              <a:t>13.05.2020</a:t>
             </a:fld>
             <a:endParaRPr lang="fr-CH"/>
           </a:p>
@@ -764,7 +765,7 @@
           <a:p>
             <a:fld id="{A019C843-81E1-4383-9F8F-73842B62BEA2}" type="datetimeFigureOut">
               <a:rPr lang="fr-CH" smtClean="0"/>
-              <a:t>30.04.2020</a:t>
+              <a:t>13.05.2020</a:t>
             </a:fld>
             <a:endParaRPr lang="fr-CH"/>
           </a:p>
@@ -1008,7 +1009,7 @@
           <a:p>
             <a:fld id="{A019C843-81E1-4383-9F8F-73842B62BEA2}" type="datetimeFigureOut">
               <a:rPr lang="fr-CH" smtClean="0"/>
-              <a:t>30.04.2020</a:t>
+              <a:t>13.05.2020</a:t>
             </a:fld>
             <a:endParaRPr lang="fr-CH"/>
           </a:p>
@@ -1240,7 +1241,7 @@
           <a:p>
             <a:fld id="{A019C843-81E1-4383-9F8F-73842B62BEA2}" type="datetimeFigureOut">
               <a:rPr lang="fr-CH" smtClean="0"/>
-              <a:t>30.04.2020</a:t>
+              <a:t>13.05.2020</a:t>
             </a:fld>
             <a:endParaRPr lang="fr-CH"/>
           </a:p>
@@ -1607,7 +1608,7 @@
           <a:p>
             <a:fld id="{A019C843-81E1-4383-9F8F-73842B62BEA2}" type="datetimeFigureOut">
               <a:rPr lang="fr-CH" smtClean="0"/>
-              <a:t>30.04.2020</a:t>
+              <a:t>13.05.2020</a:t>
             </a:fld>
             <a:endParaRPr lang="fr-CH"/>
           </a:p>
@@ -1725,7 +1726,7 @@
           <a:p>
             <a:fld id="{A019C843-81E1-4383-9F8F-73842B62BEA2}" type="datetimeFigureOut">
               <a:rPr lang="fr-CH" smtClean="0"/>
-              <a:t>30.04.2020</a:t>
+              <a:t>13.05.2020</a:t>
             </a:fld>
             <a:endParaRPr lang="fr-CH"/>
           </a:p>
@@ -1820,7 +1821,7 @@
           <a:p>
             <a:fld id="{A019C843-81E1-4383-9F8F-73842B62BEA2}" type="datetimeFigureOut">
               <a:rPr lang="fr-CH" smtClean="0"/>
-              <a:t>30.04.2020</a:t>
+              <a:t>13.05.2020</a:t>
             </a:fld>
             <a:endParaRPr lang="fr-CH"/>
           </a:p>
@@ -2097,7 +2098,7 @@
           <a:p>
             <a:fld id="{A019C843-81E1-4383-9F8F-73842B62BEA2}" type="datetimeFigureOut">
               <a:rPr lang="fr-CH" smtClean="0"/>
-              <a:t>30.04.2020</a:t>
+              <a:t>13.05.2020</a:t>
             </a:fld>
             <a:endParaRPr lang="fr-CH"/>
           </a:p>
@@ -2354,7 +2355,7 @@
           <a:p>
             <a:fld id="{A019C843-81E1-4383-9F8F-73842B62BEA2}" type="datetimeFigureOut">
               <a:rPr lang="fr-CH" smtClean="0"/>
-              <a:t>30.04.2020</a:t>
+              <a:t>13.05.2020</a:t>
             </a:fld>
             <a:endParaRPr lang="fr-CH"/>
           </a:p>
@@ -2567,7 +2568,7 @@
           <a:p>
             <a:fld id="{A019C843-81E1-4383-9F8F-73842B62BEA2}" type="datetimeFigureOut">
               <a:rPr lang="fr-CH" smtClean="0"/>
-              <a:t>30.04.2020</a:t>
+              <a:t>13.05.2020</a:t>
             </a:fld>
             <a:endParaRPr lang="fr-CH"/>
           </a:p>
@@ -2974,10 +2975,10 @@
       </p:grpSpPr>
       <p:pic>
         <p:nvPicPr>
-          <p:cNvPr id="8" name="Image 7">
-            <a:extLst>
-              <a:ext uri="{FF2B5EF4-FFF2-40B4-BE49-F238E27FC236}">
-                <a16:creationId xmlns:a16="http://schemas.microsoft.com/office/drawing/2014/main" id="{34FFAE9D-6192-4080-98AB-839D1A7616AB}"/>
+          <p:cNvPr id="2" name="Image 1">
+            <a:extLst>
+              <a:ext uri="{FF2B5EF4-FFF2-40B4-BE49-F238E27FC236}">
+                <a16:creationId xmlns:a16="http://schemas.microsoft.com/office/drawing/2014/main" id="{2C9CB4DE-F3EC-40A7-B4D5-705C9608D4CD}"/>
               </a:ext>
             </a:extLst>
           </p:cNvPr>
@@ -2994,8 +2995,8 @@
         </p:blipFill>
         <p:spPr>
           <a:xfrm>
-            <a:off x="2239912" y="2418641"/>
-            <a:ext cx="2502000" cy="3952023"/>
+            <a:off x="2283030" y="2416232"/>
+            <a:ext cx="2451298" cy="3966386"/>
           </a:xfrm>
           <a:prstGeom prst="rect">
             <a:avLst/>
@@ -3016,8 +3017,8 @@
         </p:nvSpPr>
         <p:spPr>
           <a:xfrm>
-            <a:off x="2185988" y="2603319"/>
-            <a:ext cx="1624012" cy="179568"/>
+            <a:off x="2185987" y="2603319"/>
+            <a:ext cx="1933575" cy="179568"/>
           </a:xfrm>
           <a:prstGeom prst="ellipse">
             <a:avLst/>
@@ -3132,7 +3133,7 @@
         <p:spPr>
           <a:xfrm flipH="1" flipV="1">
             <a:off x="2787650" y="2317903"/>
-            <a:ext cx="210344" cy="285416"/>
+            <a:ext cx="365125" cy="285416"/>
           </a:xfrm>
           <a:prstGeom prst="line">
             <a:avLst/>
@@ -3387,7 +3388,7 @@
         </p:nvSpPr>
         <p:spPr>
           <a:xfrm>
-            <a:off x="4305558" y="2806700"/>
+            <a:off x="4318258" y="2806700"/>
             <a:ext cx="367783" cy="298450"/>
           </a:xfrm>
           <a:prstGeom prst="ellipse">
@@ -3443,8 +3444,8 @@
         </p:nvCxnSpPr>
         <p:spPr>
           <a:xfrm flipV="1">
-            <a:off x="4673341" y="2918756"/>
-            <a:ext cx="374909" cy="37169"/>
+            <a:off x="4686041" y="2918756"/>
+            <a:ext cx="362209" cy="37169"/>
           </a:xfrm>
           <a:prstGeom prst="line">
             <a:avLst/>
@@ -3543,7 +3544,7 @@
         </p:nvSpPr>
         <p:spPr>
           <a:xfrm>
-            <a:off x="2327403" y="3128963"/>
+            <a:off x="2333753" y="3119437"/>
             <a:ext cx="367783" cy="117474"/>
           </a:xfrm>
           <a:prstGeom prst="ellipse">
@@ -3598,8 +3599,8 @@
         </p:nvCxnSpPr>
         <p:spPr>
           <a:xfrm flipV="1">
-            <a:off x="2108200" y="3229233"/>
-            <a:ext cx="273064" cy="676723"/>
+            <a:off x="2108200" y="3219707"/>
+            <a:ext cx="279414" cy="686249"/>
           </a:xfrm>
           <a:prstGeom prst="line">
             <a:avLst/>
@@ -3698,7 +3699,7 @@
         </p:nvSpPr>
         <p:spPr>
           <a:xfrm>
-            <a:off x="4276853" y="3128963"/>
+            <a:off x="4289553" y="3119437"/>
             <a:ext cx="367783" cy="117474"/>
           </a:xfrm>
           <a:prstGeom prst="ellipse">
@@ -3754,8 +3755,8 @@
         </p:nvCxnSpPr>
         <p:spPr>
           <a:xfrm>
-            <a:off x="4590775" y="3229233"/>
-            <a:ext cx="457475" cy="676723"/>
+            <a:off x="4603475" y="3219707"/>
+            <a:ext cx="444775" cy="686249"/>
           </a:xfrm>
           <a:prstGeom prst="line">
             <a:avLst/>
@@ -3795,8 +3796,8 @@
         </p:nvSpPr>
         <p:spPr>
           <a:xfrm>
-            <a:off x="3514451" y="3128963"/>
-            <a:ext cx="724174" cy="117474"/>
+            <a:off x="3527151" y="3105150"/>
+            <a:ext cx="724174" cy="141287"/>
           </a:xfrm>
           <a:prstGeom prst="ellipse">
             <a:avLst/>
@@ -3925,8 +3926,8 @@
         </p:nvCxnSpPr>
         <p:spPr>
           <a:xfrm>
-            <a:off x="3876538" y="3246437"/>
-            <a:ext cx="1171712" cy="1566362"/>
+            <a:off x="3889238" y="3246437"/>
+            <a:ext cx="1159012" cy="1566362"/>
           </a:xfrm>
           <a:prstGeom prst="line">
             <a:avLst/>
@@ -4240,8 +4241,8 @@
         </p:nvSpPr>
         <p:spPr>
           <a:xfrm>
-            <a:off x="2742731" y="3128963"/>
-            <a:ext cx="724174" cy="117474"/>
+            <a:off x="2742731" y="3105150"/>
+            <a:ext cx="724174" cy="141287"/>
           </a:xfrm>
           <a:prstGeom prst="ellipse">
             <a:avLst/>
@@ -6050,6 +6051,829 @@
     <p:extLst>
       <p:ext uri="{BB962C8B-B14F-4D97-AF65-F5344CB8AC3E}">
         <p14:creationId xmlns:p14="http://schemas.microsoft.com/office/powerpoint/2010/main" val="622426086"/>
+      </p:ext>
+    </p:extLst>
+  </p:cSld>
+  <p:clrMapOvr>
+    <a:masterClrMapping/>
+  </p:clrMapOvr>
+</p:sld>
+</file>
+
+<file path=ppt/slides/slide3.xml><?xml version="1.0" encoding="utf-8"?>
+<p:sld xmlns:a="http://schemas.openxmlformats.org/drawingml/2006/main" xmlns:r="http://schemas.openxmlformats.org/officeDocument/2006/relationships" xmlns:p="http://schemas.openxmlformats.org/presentationml/2006/main">
+  <p:cSld>
+    <p:spTree>
+      <p:nvGrpSpPr>
+        <p:cNvPr id="1" name=""/>
+        <p:cNvGrpSpPr/>
+        <p:nvPr/>
+      </p:nvGrpSpPr>
+      <p:grpSpPr>
+        <a:xfrm>
+          <a:off x="0" y="0"/>
+          <a:ext cx="0" cy="0"/>
+          <a:chOff x="0" y="0"/>
+          <a:chExt cx="0" cy="0"/>
+        </a:xfrm>
+      </p:grpSpPr>
+      <p:pic>
+        <p:nvPicPr>
+          <p:cNvPr id="2" name="Image 1">
+            <a:extLst>
+              <a:ext uri="{FF2B5EF4-FFF2-40B4-BE49-F238E27FC236}">
+                <a16:creationId xmlns:a16="http://schemas.microsoft.com/office/drawing/2014/main" id="{F4A9522F-FBBC-4D62-8F46-D0DF863EB594}"/>
+              </a:ext>
+            </a:extLst>
+          </p:cNvPr>
+          <p:cNvPicPr>
+            <a:picLocks noChangeAspect="1"/>
+          </p:cNvPicPr>
+          <p:nvPr/>
+        </p:nvPicPr>
+        <p:blipFill>
+          <a:blip r:embed="rId2"/>
+          <a:stretch>
+            <a:fillRect/>
+          </a:stretch>
+        </p:blipFill>
+        <p:spPr>
+          <a:xfrm>
+            <a:off x="1809952" y="2324428"/>
+            <a:ext cx="3238095" cy="5257143"/>
+          </a:xfrm>
+          <a:prstGeom prst="rect">
+            <a:avLst/>
+          </a:prstGeom>
+        </p:spPr>
+      </p:pic>
+      <p:sp>
+        <p:nvSpPr>
+          <p:cNvPr id="3" name="Rectangle 2">
+            <a:extLst>
+              <a:ext uri="{FF2B5EF4-FFF2-40B4-BE49-F238E27FC236}">
+                <a16:creationId xmlns:a16="http://schemas.microsoft.com/office/drawing/2014/main" id="{D125CE23-BC74-4AD0-8023-07659B16E48F}"/>
+              </a:ext>
+            </a:extLst>
+          </p:cNvPr>
+          <p:cNvSpPr/>
+          <p:nvPr/>
+        </p:nvSpPr>
+        <p:spPr>
+          <a:xfrm>
+            <a:off x="5282053" y="2643809"/>
+            <a:ext cx="1059112" cy="536415"/>
+          </a:xfrm>
+          <a:prstGeom prst="rect">
+            <a:avLst/>
+          </a:prstGeom>
+          <a:solidFill>
+            <a:schemeClr val="bg1"/>
+          </a:solidFill>
+          <a:ln>
+            <a:noFill/>
+          </a:ln>
+        </p:spPr>
+        <p:style>
+          <a:lnRef idx="2">
+            <a:schemeClr val="accent1">
+              <a:shade val="50000"/>
+            </a:schemeClr>
+          </a:lnRef>
+          <a:fillRef idx="1">
+            <a:schemeClr val="accent1"/>
+          </a:fillRef>
+          <a:effectRef idx="0">
+            <a:schemeClr val="accent1"/>
+          </a:effectRef>
+          <a:fontRef idx="minor">
+            <a:schemeClr val="lt1"/>
+          </a:fontRef>
+        </p:style>
+        <p:txBody>
+          <a:bodyPr rtlCol="0" anchor="ctr"/>
+          <a:lstStyle/>
+          <a:p>
+            <a:pPr algn="ctr"/>
+            <a:r>
+              <a:rPr lang="fr-CH" sz="1100" dirty="0">
+                <a:solidFill>
+                  <a:srgbClr val="FF0000"/>
+                </a:solidFill>
+              </a:rPr>
+              <a:t>Nom de la configuration.</a:t>
+            </a:r>
+          </a:p>
+        </p:txBody>
+      </p:sp>
+      <p:sp>
+        <p:nvSpPr>
+          <p:cNvPr id="4" name="Ellipse 3">
+            <a:extLst>
+              <a:ext uri="{FF2B5EF4-FFF2-40B4-BE49-F238E27FC236}">
+                <a16:creationId xmlns:a16="http://schemas.microsoft.com/office/drawing/2014/main" id="{167821CA-ECEC-42DA-98BC-1DB8BE700CF0}"/>
+              </a:ext>
+            </a:extLst>
+          </p:cNvPr>
+          <p:cNvSpPr/>
+          <p:nvPr/>
+        </p:nvSpPr>
+        <p:spPr>
+          <a:xfrm>
+            <a:off x="2832652" y="3289852"/>
+            <a:ext cx="2215395" cy="258418"/>
+          </a:xfrm>
+          <a:prstGeom prst="ellipse">
+            <a:avLst/>
+          </a:prstGeom>
+          <a:ln w="12700">
+            <a:solidFill>
+              <a:srgbClr val="FF0000"/>
+            </a:solidFill>
+          </a:ln>
+        </p:spPr>
+        <p:style>
+          <a:lnRef idx="1">
+            <a:schemeClr val="accent1"/>
+          </a:lnRef>
+          <a:fillRef idx="0">
+            <a:schemeClr val="accent1"/>
+          </a:fillRef>
+          <a:effectRef idx="0">
+            <a:schemeClr val="accent1"/>
+          </a:effectRef>
+          <a:fontRef idx="minor">
+            <a:schemeClr val="tx1"/>
+          </a:fontRef>
+        </p:style>
+        <p:txBody>
+          <a:bodyPr rtlCol="0" anchor="ctr"/>
+          <a:lstStyle/>
+          <a:p>
+            <a:pPr algn="ctr"/>
+            <a:endParaRPr lang="fr-CH"/>
+          </a:p>
+        </p:txBody>
+      </p:sp>
+      <p:cxnSp>
+        <p:nvCxnSpPr>
+          <p:cNvPr id="6" name="Connecteur droit 5">
+            <a:extLst>
+              <a:ext uri="{FF2B5EF4-FFF2-40B4-BE49-F238E27FC236}">
+                <a16:creationId xmlns:a16="http://schemas.microsoft.com/office/drawing/2014/main" id="{8A9749F5-0EED-4F00-812F-7F02C613D966}"/>
+              </a:ext>
+            </a:extLst>
+          </p:cNvPr>
+          <p:cNvCxnSpPr>
+            <a:cxnSpLocks/>
+            <a:stCxn id="4" idx="6"/>
+            <a:endCxn id="3" idx="2"/>
+          </p:cNvCxnSpPr>
+          <p:nvPr/>
+        </p:nvCxnSpPr>
+        <p:spPr>
+          <a:xfrm flipV="1">
+            <a:off x="5048047" y="3180224"/>
+            <a:ext cx="763562" cy="238837"/>
+          </a:xfrm>
+          <a:prstGeom prst="line">
+            <a:avLst/>
+          </a:prstGeom>
+          <a:ln>
+            <a:solidFill>
+              <a:srgbClr val="FF0000"/>
+            </a:solidFill>
+          </a:ln>
+        </p:spPr>
+        <p:style>
+          <a:lnRef idx="1">
+            <a:schemeClr val="accent1"/>
+          </a:lnRef>
+          <a:fillRef idx="0">
+            <a:schemeClr val="accent1"/>
+          </a:fillRef>
+          <a:effectRef idx="0">
+            <a:schemeClr val="accent1"/>
+          </a:effectRef>
+          <a:fontRef idx="minor">
+            <a:schemeClr val="tx1"/>
+          </a:fontRef>
+        </p:style>
+      </p:cxnSp>
+      <p:sp>
+        <p:nvSpPr>
+          <p:cNvPr id="8" name="Rectangle 7">
+            <a:extLst>
+              <a:ext uri="{FF2B5EF4-FFF2-40B4-BE49-F238E27FC236}">
+                <a16:creationId xmlns:a16="http://schemas.microsoft.com/office/drawing/2014/main" id="{6B839AA3-BCFA-43D4-95FC-B25C3A4DD9C7}"/>
+              </a:ext>
+            </a:extLst>
+          </p:cNvPr>
+          <p:cNvSpPr/>
+          <p:nvPr/>
+        </p:nvSpPr>
+        <p:spPr>
+          <a:xfrm>
+            <a:off x="636104" y="3422374"/>
+            <a:ext cx="939842" cy="466841"/>
+          </a:xfrm>
+          <a:prstGeom prst="rect">
+            <a:avLst/>
+          </a:prstGeom>
+          <a:solidFill>
+            <a:schemeClr val="bg1"/>
+          </a:solidFill>
+          <a:ln>
+            <a:noFill/>
+          </a:ln>
+        </p:spPr>
+        <p:style>
+          <a:lnRef idx="2">
+            <a:schemeClr val="accent1">
+              <a:shade val="50000"/>
+            </a:schemeClr>
+          </a:lnRef>
+          <a:fillRef idx="1">
+            <a:schemeClr val="accent1"/>
+          </a:fillRef>
+          <a:effectRef idx="0">
+            <a:schemeClr val="accent1"/>
+          </a:effectRef>
+          <a:fontRef idx="minor">
+            <a:schemeClr val="lt1"/>
+          </a:fontRef>
+        </p:style>
+        <p:txBody>
+          <a:bodyPr rtlCol="0" anchor="ctr"/>
+          <a:lstStyle/>
+          <a:p>
+            <a:pPr algn="ctr"/>
+            <a:r>
+              <a:rPr lang="fr-CH" sz="1100" dirty="0">
+                <a:solidFill>
+                  <a:srgbClr val="FF0000"/>
+                </a:solidFill>
+              </a:rPr>
+              <a:t>Bouton sauvegarder.</a:t>
+            </a:r>
+          </a:p>
+        </p:txBody>
+      </p:sp>
+      <p:sp>
+        <p:nvSpPr>
+          <p:cNvPr id="9" name="Ellipse 8">
+            <a:extLst>
+              <a:ext uri="{FF2B5EF4-FFF2-40B4-BE49-F238E27FC236}">
+                <a16:creationId xmlns:a16="http://schemas.microsoft.com/office/drawing/2014/main" id="{E8B3CD15-7CC0-4339-98A4-08FFFC0BF53D}"/>
+              </a:ext>
+            </a:extLst>
+          </p:cNvPr>
+          <p:cNvSpPr/>
+          <p:nvPr/>
+        </p:nvSpPr>
+        <p:spPr>
+          <a:xfrm>
+            <a:off x="2633867" y="3675672"/>
+            <a:ext cx="1590264" cy="258418"/>
+          </a:xfrm>
+          <a:prstGeom prst="ellipse">
+            <a:avLst/>
+          </a:prstGeom>
+          <a:ln w="12700">
+            <a:solidFill>
+              <a:srgbClr val="FF0000"/>
+            </a:solidFill>
+          </a:ln>
+        </p:spPr>
+        <p:style>
+          <a:lnRef idx="1">
+            <a:schemeClr val="accent1"/>
+          </a:lnRef>
+          <a:fillRef idx="0">
+            <a:schemeClr val="accent1"/>
+          </a:fillRef>
+          <a:effectRef idx="0">
+            <a:schemeClr val="accent1"/>
+          </a:effectRef>
+          <a:fontRef idx="minor">
+            <a:schemeClr val="tx1"/>
+          </a:fontRef>
+        </p:style>
+        <p:txBody>
+          <a:bodyPr rtlCol="0" anchor="ctr"/>
+          <a:lstStyle/>
+          <a:p>
+            <a:pPr algn="ctr"/>
+            <a:endParaRPr lang="fr-CH"/>
+          </a:p>
+        </p:txBody>
+      </p:sp>
+      <p:cxnSp>
+        <p:nvCxnSpPr>
+          <p:cNvPr id="11" name="Connecteur droit 10">
+            <a:extLst>
+              <a:ext uri="{FF2B5EF4-FFF2-40B4-BE49-F238E27FC236}">
+                <a16:creationId xmlns:a16="http://schemas.microsoft.com/office/drawing/2014/main" id="{6391A9AD-BA49-4FDD-AEC1-99C590FEC2BD}"/>
+              </a:ext>
+            </a:extLst>
+          </p:cNvPr>
+          <p:cNvCxnSpPr>
+            <a:cxnSpLocks/>
+            <a:stCxn id="8" idx="3"/>
+            <a:endCxn id="9" idx="2"/>
+          </p:cNvCxnSpPr>
+          <p:nvPr/>
+        </p:nvCxnSpPr>
+        <p:spPr>
+          <a:xfrm>
+            <a:off x="1575946" y="3655795"/>
+            <a:ext cx="1057921" cy="149086"/>
+          </a:xfrm>
+          <a:prstGeom prst="line">
+            <a:avLst/>
+          </a:prstGeom>
+          <a:ln>
+            <a:solidFill>
+              <a:srgbClr val="FF0000"/>
+            </a:solidFill>
+          </a:ln>
+        </p:spPr>
+        <p:style>
+          <a:lnRef idx="1">
+            <a:schemeClr val="accent1"/>
+          </a:lnRef>
+          <a:fillRef idx="0">
+            <a:schemeClr val="accent1"/>
+          </a:fillRef>
+          <a:effectRef idx="0">
+            <a:schemeClr val="accent1"/>
+          </a:effectRef>
+          <a:fontRef idx="minor">
+            <a:schemeClr val="tx1"/>
+          </a:fontRef>
+        </p:style>
+      </p:cxnSp>
+      <p:sp>
+        <p:nvSpPr>
+          <p:cNvPr id="13" name="Rectangle 12">
+            <a:extLst>
+              <a:ext uri="{FF2B5EF4-FFF2-40B4-BE49-F238E27FC236}">
+                <a16:creationId xmlns:a16="http://schemas.microsoft.com/office/drawing/2014/main" id="{A4DC5E86-1289-4BBD-B6AE-4F5E109663D1}"/>
+              </a:ext>
+            </a:extLst>
+          </p:cNvPr>
+          <p:cNvSpPr/>
+          <p:nvPr/>
+        </p:nvSpPr>
+        <p:spPr>
+          <a:xfrm>
+            <a:off x="5282053" y="5157266"/>
+            <a:ext cx="1212850" cy="466841"/>
+          </a:xfrm>
+          <a:prstGeom prst="rect">
+            <a:avLst/>
+          </a:prstGeom>
+          <a:solidFill>
+            <a:schemeClr val="bg1"/>
+          </a:solidFill>
+          <a:ln>
+            <a:noFill/>
+          </a:ln>
+        </p:spPr>
+        <p:style>
+          <a:lnRef idx="2">
+            <a:schemeClr val="accent1">
+              <a:shade val="50000"/>
+            </a:schemeClr>
+          </a:lnRef>
+          <a:fillRef idx="1">
+            <a:schemeClr val="accent1"/>
+          </a:fillRef>
+          <a:effectRef idx="0">
+            <a:schemeClr val="accent1"/>
+          </a:effectRef>
+          <a:fontRef idx="minor">
+            <a:schemeClr val="lt1"/>
+          </a:fontRef>
+        </p:style>
+        <p:txBody>
+          <a:bodyPr rtlCol="0" anchor="ctr"/>
+          <a:lstStyle/>
+          <a:p>
+            <a:pPr algn="ctr"/>
+            <a:r>
+              <a:rPr lang="fr-CH" sz="1100" dirty="0">
+                <a:solidFill>
+                  <a:srgbClr val="FF0000"/>
+                </a:solidFill>
+              </a:rPr>
+              <a:t>Bouton charger.</a:t>
+            </a:r>
+          </a:p>
+        </p:txBody>
+      </p:sp>
+      <p:sp>
+        <p:nvSpPr>
+          <p:cNvPr id="14" name="Ellipse 13">
+            <a:extLst>
+              <a:ext uri="{FF2B5EF4-FFF2-40B4-BE49-F238E27FC236}">
+                <a16:creationId xmlns:a16="http://schemas.microsoft.com/office/drawing/2014/main" id="{DB1DBF70-790D-4A24-B01C-BFC23F3C5A69}"/>
+              </a:ext>
+            </a:extLst>
+          </p:cNvPr>
+          <p:cNvSpPr/>
+          <p:nvPr/>
+        </p:nvSpPr>
+        <p:spPr>
+          <a:xfrm>
+            <a:off x="3780210" y="5371107"/>
+            <a:ext cx="1179416" cy="258418"/>
+          </a:xfrm>
+          <a:prstGeom prst="ellipse">
+            <a:avLst/>
+          </a:prstGeom>
+          <a:ln w="12700">
+            <a:solidFill>
+              <a:srgbClr val="FF0000"/>
+            </a:solidFill>
+          </a:ln>
+        </p:spPr>
+        <p:style>
+          <a:lnRef idx="1">
+            <a:schemeClr val="accent1"/>
+          </a:lnRef>
+          <a:fillRef idx="0">
+            <a:schemeClr val="accent1"/>
+          </a:fillRef>
+          <a:effectRef idx="0">
+            <a:schemeClr val="accent1"/>
+          </a:effectRef>
+          <a:fontRef idx="minor">
+            <a:schemeClr val="tx1"/>
+          </a:fontRef>
+        </p:style>
+        <p:txBody>
+          <a:bodyPr rtlCol="0" anchor="ctr"/>
+          <a:lstStyle/>
+          <a:p>
+            <a:pPr algn="ctr"/>
+            <a:endParaRPr lang="fr-CH"/>
+          </a:p>
+        </p:txBody>
+      </p:sp>
+      <p:sp>
+        <p:nvSpPr>
+          <p:cNvPr id="15" name="Ellipse 14">
+            <a:extLst>
+              <a:ext uri="{FF2B5EF4-FFF2-40B4-BE49-F238E27FC236}">
+                <a16:creationId xmlns:a16="http://schemas.microsoft.com/office/drawing/2014/main" id="{3DF3B228-9ABA-456A-9F83-1B191DE60DDA}"/>
+              </a:ext>
+            </a:extLst>
+          </p:cNvPr>
+          <p:cNvSpPr/>
+          <p:nvPr/>
+        </p:nvSpPr>
+        <p:spPr>
+          <a:xfrm>
+            <a:off x="3780210" y="6032872"/>
+            <a:ext cx="1179416" cy="258418"/>
+          </a:xfrm>
+          <a:prstGeom prst="ellipse">
+            <a:avLst/>
+          </a:prstGeom>
+          <a:ln w="12700">
+            <a:solidFill>
+              <a:srgbClr val="FF0000"/>
+            </a:solidFill>
+          </a:ln>
+        </p:spPr>
+        <p:style>
+          <a:lnRef idx="1">
+            <a:schemeClr val="accent1"/>
+          </a:lnRef>
+          <a:fillRef idx="0">
+            <a:schemeClr val="accent1"/>
+          </a:fillRef>
+          <a:effectRef idx="0">
+            <a:schemeClr val="accent1"/>
+          </a:effectRef>
+          <a:fontRef idx="minor">
+            <a:schemeClr val="tx1"/>
+          </a:fontRef>
+        </p:style>
+        <p:txBody>
+          <a:bodyPr rtlCol="0" anchor="ctr"/>
+          <a:lstStyle/>
+          <a:p>
+            <a:pPr algn="ctr"/>
+            <a:endParaRPr lang="fr-CH"/>
+          </a:p>
+        </p:txBody>
+      </p:sp>
+      <p:sp>
+        <p:nvSpPr>
+          <p:cNvPr id="16" name="Rectangle 15">
+            <a:extLst>
+              <a:ext uri="{FF2B5EF4-FFF2-40B4-BE49-F238E27FC236}">
+                <a16:creationId xmlns:a16="http://schemas.microsoft.com/office/drawing/2014/main" id="{149AEEC3-6E18-40AE-A92B-68750756A8D7}"/>
+              </a:ext>
+            </a:extLst>
+          </p:cNvPr>
+          <p:cNvSpPr/>
+          <p:nvPr/>
+        </p:nvSpPr>
+        <p:spPr>
+          <a:xfrm>
+            <a:off x="5282053" y="5799451"/>
+            <a:ext cx="1212850" cy="466841"/>
+          </a:xfrm>
+          <a:prstGeom prst="rect">
+            <a:avLst/>
+          </a:prstGeom>
+          <a:solidFill>
+            <a:schemeClr val="bg1"/>
+          </a:solidFill>
+          <a:ln>
+            <a:noFill/>
+          </a:ln>
+        </p:spPr>
+        <p:style>
+          <a:lnRef idx="2">
+            <a:schemeClr val="accent1">
+              <a:shade val="50000"/>
+            </a:schemeClr>
+          </a:lnRef>
+          <a:fillRef idx="1">
+            <a:schemeClr val="accent1"/>
+          </a:fillRef>
+          <a:effectRef idx="0">
+            <a:schemeClr val="accent1"/>
+          </a:effectRef>
+          <a:fontRef idx="minor">
+            <a:schemeClr val="lt1"/>
+          </a:fontRef>
+        </p:style>
+        <p:txBody>
+          <a:bodyPr rtlCol="0" anchor="ctr"/>
+          <a:lstStyle/>
+          <a:p>
+            <a:pPr algn="ctr"/>
+            <a:r>
+              <a:rPr lang="fr-CH" sz="1100" dirty="0">
+                <a:solidFill>
+                  <a:srgbClr val="FF0000"/>
+                </a:solidFill>
+              </a:rPr>
+              <a:t>Bouton effacer.</a:t>
+            </a:r>
+          </a:p>
+        </p:txBody>
+      </p:sp>
+      <p:cxnSp>
+        <p:nvCxnSpPr>
+          <p:cNvPr id="18" name="Connecteur droit 17">
+            <a:extLst>
+              <a:ext uri="{FF2B5EF4-FFF2-40B4-BE49-F238E27FC236}">
+                <a16:creationId xmlns:a16="http://schemas.microsoft.com/office/drawing/2014/main" id="{402142CA-56D6-433B-B4C1-E32A7C890E74}"/>
+              </a:ext>
+            </a:extLst>
+          </p:cNvPr>
+          <p:cNvCxnSpPr>
+            <a:stCxn id="14" idx="6"/>
+            <a:endCxn id="13" idx="1"/>
+          </p:cNvCxnSpPr>
+          <p:nvPr/>
+        </p:nvCxnSpPr>
+        <p:spPr>
+          <a:xfrm flipV="1">
+            <a:off x="4959626" y="5390687"/>
+            <a:ext cx="322427" cy="109629"/>
+          </a:xfrm>
+          <a:prstGeom prst="line">
+            <a:avLst/>
+          </a:prstGeom>
+          <a:ln>
+            <a:solidFill>
+              <a:srgbClr val="FF0000"/>
+            </a:solidFill>
+          </a:ln>
+        </p:spPr>
+        <p:style>
+          <a:lnRef idx="1">
+            <a:schemeClr val="accent1"/>
+          </a:lnRef>
+          <a:fillRef idx="0">
+            <a:schemeClr val="accent1"/>
+          </a:fillRef>
+          <a:effectRef idx="0">
+            <a:schemeClr val="accent1"/>
+          </a:effectRef>
+          <a:fontRef idx="minor">
+            <a:schemeClr val="tx1"/>
+          </a:fontRef>
+        </p:style>
+      </p:cxnSp>
+      <p:cxnSp>
+        <p:nvCxnSpPr>
+          <p:cNvPr id="20" name="Connecteur droit 19">
+            <a:extLst>
+              <a:ext uri="{FF2B5EF4-FFF2-40B4-BE49-F238E27FC236}">
+                <a16:creationId xmlns:a16="http://schemas.microsoft.com/office/drawing/2014/main" id="{6F08B519-BE24-4A9D-BAC8-474D1C2FBC82}"/>
+              </a:ext>
+            </a:extLst>
+          </p:cNvPr>
+          <p:cNvCxnSpPr>
+            <a:stCxn id="15" idx="6"/>
+            <a:endCxn id="16" idx="1"/>
+          </p:cNvCxnSpPr>
+          <p:nvPr/>
+        </p:nvCxnSpPr>
+        <p:spPr>
+          <a:xfrm flipV="1">
+            <a:off x="4959626" y="6032872"/>
+            <a:ext cx="322427" cy="129209"/>
+          </a:xfrm>
+          <a:prstGeom prst="line">
+            <a:avLst/>
+          </a:prstGeom>
+          <a:ln>
+            <a:solidFill>
+              <a:srgbClr val="FF0000"/>
+            </a:solidFill>
+          </a:ln>
+        </p:spPr>
+        <p:style>
+          <a:lnRef idx="1">
+            <a:schemeClr val="accent1"/>
+          </a:lnRef>
+          <a:fillRef idx="0">
+            <a:schemeClr val="accent1"/>
+          </a:fillRef>
+          <a:effectRef idx="0">
+            <a:schemeClr val="accent1"/>
+          </a:effectRef>
+          <a:fontRef idx="minor">
+            <a:schemeClr val="tx1"/>
+          </a:fontRef>
+        </p:style>
+      </p:cxnSp>
+      <p:sp>
+        <p:nvSpPr>
+          <p:cNvPr id="21" name="Ellipse 20">
+            <a:extLst>
+              <a:ext uri="{FF2B5EF4-FFF2-40B4-BE49-F238E27FC236}">
+                <a16:creationId xmlns:a16="http://schemas.microsoft.com/office/drawing/2014/main" id="{6B0BB3F7-3890-48A8-9615-CA828F86F547}"/>
+              </a:ext>
+            </a:extLst>
+          </p:cNvPr>
+          <p:cNvSpPr/>
+          <p:nvPr/>
+        </p:nvSpPr>
+        <p:spPr>
+          <a:xfrm>
+            <a:off x="1809952" y="4422914"/>
+            <a:ext cx="1970258" cy="1077402"/>
+          </a:xfrm>
+          <a:prstGeom prst="ellipse">
+            <a:avLst/>
+          </a:prstGeom>
+          <a:ln w="12700">
+            <a:solidFill>
+              <a:srgbClr val="FF0000"/>
+            </a:solidFill>
+          </a:ln>
+        </p:spPr>
+        <p:style>
+          <a:lnRef idx="1">
+            <a:schemeClr val="accent1"/>
+          </a:lnRef>
+          <a:fillRef idx="0">
+            <a:schemeClr val="accent1"/>
+          </a:fillRef>
+          <a:effectRef idx="0">
+            <a:schemeClr val="accent1"/>
+          </a:effectRef>
+          <a:fontRef idx="minor">
+            <a:schemeClr val="tx1"/>
+          </a:fontRef>
+        </p:style>
+        <p:txBody>
+          <a:bodyPr rtlCol="0" anchor="ctr"/>
+          <a:lstStyle/>
+          <a:p>
+            <a:pPr algn="ctr"/>
+            <a:endParaRPr lang="fr-CH"/>
+          </a:p>
+        </p:txBody>
+      </p:sp>
+      <p:sp>
+        <p:nvSpPr>
+          <p:cNvPr id="22" name="Rectangle 21">
+            <a:extLst>
+              <a:ext uri="{FF2B5EF4-FFF2-40B4-BE49-F238E27FC236}">
+                <a16:creationId xmlns:a16="http://schemas.microsoft.com/office/drawing/2014/main" id="{F2AED996-E166-42B7-99D7-1C0ACDCB8AC3}"/>
+              </a:ext>
+            </a:extLst>
+          </p:cNvPr>
+          <p:cNvSpPr/>
+          <p:nvPr/>
+        </p:nvSpPr>
+        <p:spPr>
+          <a:xfrm>
+            <a:off x="523992" y="5140701"/>
+            <a:ext cx="1164066" cy="624359"/>
+          </a:xfrm>
+          <a:prstGeom prst="rect">
+            <a:avLst/>
+          </a:prstGeom>
+          <a:solidFill>
+            <a:schemeClr val="bg1"/>
+          </a:solidFill>
+          <a:ln>
+            <a:noFill/>
+          </a:ln>
+        </p:spPr>
+        <p:style>
+          <a:lnRef idx="2">
+            <a:schemeClr val="accent1">
+              <a:shade val="50000"/>
+            </a:schemeClr>
+          </a:lnRef>
+          <a:fillRef idx="1">
+            <a:schemeClr val="accent1"/>
+          </a:fillRef>
+          <a:effectRef idx="0">
+            <a:schemeClr val="accent1"/>
+          </a:effectRef>
+          <a:fontRef idx="minor">
+            <a:schemeClr val="lt1"/>
+          </a:fontRef>
+        </p:style>
+        <p:txBody>
+          <a:bodyPr rtlCol="0" anchor="ctr"/>
+          <a:lstStyle/>
+          <a:p>
+            <a:pPr algn="ctr"/>
+            <a:r>
+              <a:rPr lang="fr-CH" sz="1100" dirty="0">
+                <a:solidFill>
+                  <a:srgbClr val="FF0000"/>
+                </a:solidFill>
+              </a:rPr>
+              <a:t>Liste des configurations sauvegardées.</a:t>
+            </a:r>
+          </a:p>
+        </p:txBody>
+      </p:sp>
+      <p:cxnSp>
+        <p:nvCxnSpPr>
+          <p:cNvPr id="24" name="Connecteur droit 23">
+            <a:extLst>
+              <a:ext uri="{FF2B5EF4-FFF2-40B4-BE49-F238E27FC236}">
+                <a16:creationId xmlns:a16="http://schemas.microsoft.com/office/drawing/2014/main" id="{C59A013F-DDD4-466C-A90F-D809E746FF47}"/>
+              </a:ext>
+            </a:extLst>
+          </p:cNvPr>
+          <p:cNvCxnSpPr>
+            <a:cxnSpLocks/>
+            <a:stCxn id="21" idx="2"/>
+            <a:endCxn id="22" idx="0"/>
+          </p:cNvCxnSpPr>
+          <p:nvPr/>
+        </p:nvCxnSpPr>
+        <p:spPr>
+          <a:xfrm flipH="1">
+            <a:off x="1106025" y="4961615"/>
+            <a:ext cx="703927" cy="179086"/>
+          </a:xfrm>
+          <a:prstGeom prst="line">
+            <a:avLst/>
+          </a:prstGeom>
+          <a:ln>
+            <a:solidFill>
+              <a:srgbClr val="FF0000"/>
+            </a:solidFill>
+          </a:ln>
+        </p:spPr>
+        <p:style>
+          <a:lnRef idx="1">
+            <a:schemeClr val="accent1"/>
+          </a:lnRef>
+          <a:fillRef idx="0">
+            <a:schemeClr val="accent1"/>
+          </a:fillRef>
+          <a:effectRef idx="0">
+            <a:schemeClr val="accent1"/>
+          </a:effectRef>
+          <a:fontRef idx="minor">
+            <a:schemeClr val="tx1"/>
+          </a:fontRef>
+        </p:style>
+      </p:cxnSp>
+    </p:spTree>
+    <p:extLst>
+      <p:ext uri="{BB962C8B-B14F-4D97-AF65-F5344CB8AC3E}">
+        <p14:creationId xmlns:p14="http://schemas.microsoft.com/office/powerpoint/2010/main" val="1522257120"/>
       </p:ext>
     </p:extLst>
   </p:cSld>

</xml_diff>